<commit_message>
working on recommendation notebook
</commit_message>
<xml_diff>
--- a/.00_scratch/ADJUSTMENTS_2024-07-11.pptx
+++ b/.00_scratch/ADJUSTMENTS_2024-07-11.pptx
@@ -223,7 +223,7 @@
           <a:p>
             <a:fld id="{7AA788AC-3429-414B-9FB5-6FC7A85B8C59}" type="datetimeFigureOut">
               <a:rPr lang="en-CA" smtClean="0"/>
-              <a:t>2024-07-11</a:t>
+              <a:t>2024-08-01</a:t>
             </a:fld>
             <a:endParaRPr lang="en-CA"/>
           </a:p>
@@ -910,7 +910,7 @@
           <a:p>
             <a:fld id="{4D37CDCD-ABC7-4B62-9ECE-0BD25CD3F378}" type="datetimeFigureOut">
               <a:rPr lang="en-CA" smtClean="0"/>
-              <a:t>2024-07-11</a:t>
+              <a:t>2024-08-01</a:t>
             </a:fld>
             <a:endParaRPr lang="en-CA"/>
           </a:p>
@@ -1080,7 +1080,7 @@
           <a:p>
             <a:fld id="{4D37CDCD-ABC7-4B62-9ECE-0BD25CD3F378}" type="datetimeFigureOut">
               <a:rPr lang="en-CA" smtClean="0"/>
-              <a:t>2024-07-11</a:t>
+              <a:t>2024-08-01</a:t>
             </a:fld>
             <a:endParaRPr lang="en-CA"/>
           </a:p>
@@ -1260,7 +1260,7 @@
           <a:p>
             <a:fld id="{4D37CDCD-ABC7-4B62-9ECE-0BD25CD3F378}" type="datetimeFigureOut">
               <a:rPr lang="en-CA" smtClean="0"/>
-              <a:t>2024-07-11</a:t>
+              <a:t>2024-08-01</a:t>
             </a:fld>
             <a:endParaRPr lang="en-CA"/>
           </a:p>
@@ -1470,7 +1470,7 @@
           <a:p>
             <a:fld id="{C20C8B91-D291-430C-99AE-51CE2103E0F3}" type="datetimeFigureOut">
               <a:rPr lang="en-CA" smtClean="0"/>
-              <a:t>2024-07-11</a:t>
+              <a:t>2024-08-01</a:t>
             </a:fld>
             <a:endParaRPr lang="en-CA"/>
           </a:p>
@@ -1670,7 +1670,7 @@
           <a:p>
             <a:fld id="{C20C8B91-D291-430C-99AE-51CE2103E0F3}" type="datetimeFigureOut">
               <a:rPr lang="en-CA" smtClean="0"/>
-              <a:t>2024-07-11</a:t>
+              <a:t>2024-08-01</a:t>
             </a:fld>
             <a:endParaRPr lang="en-CA"/>
           </a:p>
@@ -1946,7 +1946,7 @@
           <a:p>
             <a:fld id="{C20C8B91-D291-430C-99AE-51CE2103E0F3}" type="datetimeFigureOut">
               <a:rPr lang="en-CA" smtClean="0"/>
-              <a:t>2024-07-11</a:t>
+              <a:t>2024-08-01</a:t>
             </a:fld>
             <a:endParaRPr lang="en-CA"/>
           </a:p>
@@ -2214,7 +2214,7 @@
           <a:p>
             <a:fld id="{C20C8B91-D291-430C-99AE-51CE2103E0F3}" type="datetimeFigureOut">
               <a:rPr lang="en-CA" smtClean="0"/>
-              <a:t>2024-07-11</a:t>
+              <a:t>2024-08-01</a:t>
             </a:fld>
             <a:endParaRPr lang="en-CA"/>
           </a:p>
@@ -2629,7 +2629,7 @@
           <a:p>
             <a:fld id="{C20C8B91-D291-430C-99AE-51CE2103E0F3}" type="datetimeFigureOut">
               <a:rPr lang="en-CA" smtClean="0"/>
-              <a:t>2024-07-11</a:t>
+              <a:t>2024-08-01</a:t>
             </a:fld>
             <a:endParaRPr lang="en-CA"/>
           </a:p>
@@ -2771,7 +2771,7 @@
           <a:p>
             <a:fld id="{C20C8B91-D291-430C-99AE-51CE2103E0F3}" type="datetimeFigureOut">
               <a:rPr lang="en-CA" smtClean="0"/>
-              <a:t>2024-07-11</a:t>
+              <a:t>2024-08-01</a:t>
             </a:fld>
             <a:endParaRPr lang="en-CA"/>
           </a:p>
@@ -2884,7 +2884,7 @@
           <a:p>
             <a:fld id="{C20C8B91-D291-430C-99AE-51CE2103E0F3}" type="datetimeFigureOut">
               <a:rPr lang="en-CA" smtClean="0"/>
-              <a:t>2024-07-11</a:t>
+              <a:t>2024-08-01</a:t>
             </a:fld>
             <a:endParaRPr lang="en-CA"/>
           </a:p>
@@ -3197,7 +3197,7 @@
           <a:p>
             <a:fld id="{C20C8B91-D291-430C-99AE-51CE2103E0F3}" type="datetimeFigureOut">
               <a:rPr lang="en-CA" smtClean="0"/>
-              <a:t>2024-07-11</a:t>
+              <a:t>2024-08-01</a:t>
             </a:fld>
             <a:endParaRPr lang="en-CA"/>
           </a:p>
@@ -3379,7 +3379,7 @@
           <a:p>
             <a:fld id="{4D37CDCD-ABC7-4B62-9ECE-0BD25CD3F378}" type="datetimeFigureOut">
               <a:rPr lang="en-CA" smtClean="0"/>
-              <a:t>2024-07-11</a:t>
+              <a:t>2024-08-01</a:t>
             </a:fld>
             <a:endParaRPr lang="en-CA"/>
           </a:p>
@@ -3656,7 +3656,7 @@
           <a:p>
             <a:fld id="{C20C8B91-D291-430C-99AE-51CE2103E0F3}" type="datetimeFigureOut">
               <a:rPr lang="en-CA" smtClean="0"/>
-              <a:t>2024-07-11</a:t>
+              <a:t>2024-08-01</a:t>
             </a:fld>
             <a:endParaRPr lang="en-CA"/>
           </a:p>
@@ -3856,7 +3856,7 @@
           <a:p>
             <a:fld id="{C20C8B91-D291-430C-99AE-51CE2103E0F3}" type="datetimeFigureOut">
               <a:rPr lang="en-CA" smtClean="0"/>
-              <a:t>2024-07-11</a:t>
+              <a:t>2024-08-01</a:t>
             </a:fld>
             <a:endParaRPr lang="en-CA"/>
           </a:p>
@@ -4066,7 +4066,7 @@
           <a:p>
             <a:fld id="{C20C8B91-D291-430C-99AE-51CE2103E0F3}" type="datetimeFigureOut">
               <a:rPr lang="en-CA" smtClean="0"/>
-              <a:t>2024-07-11</a:t>
+              <a:t>2024-08-01</a:t>
             </a:fld>
             <a:endParaRPr lang="en-CA"/>
           </a:p>
@@ -4324,7 +4324,7 @@
           <a:p>
             <a:fld id="{4D37CDCD-ABC7-4B62-9ECE-0BD25CD3F378}" type="datetimeFigureOut">
               <a:rPr lang="en-CA" smtClean="0"/>
-              <a:t>2024-07-11</a:t>
+              <a:t>2024-08-01</a:t>
             </a:fld>
             <a:endParaRPr lang="en-CA"/>
           </a:p>
@@ -4556,7 +4556,7 @@
           <a:p>
             <a:fld id="{4D37CDCD-ABC7-4B62-9ECE-0BD25CD3F378}" type="datetimeFigureOut">
               <a:rPr lang="en-CA" smtClean="0"/>
-              <a:t>2024-07-11</a:t>
+              <a:t>2024-08-01</a:t>
             </a:fld>
             <a:endParaRPr lang="en-CA"/>
           </a:p>
@@ -4923,7 +4923,7 @@
           <a:p>
             <a:fld id="{4D37CDCD-ABC7-4B62-9ECE-0BD25CD3F378}" type="datetimeFigureOut">
               <a:rPr lang="en-CA" smtClean="0"/>
-              <a:t>2024-07-11</a:t>
+              <a:t>2024-08-01</a:t>
             </a:fld>
             <a:endParaRPr lang="en-CA"/>
           </a:p>
@@ -5041,7 +5041,7 @@
           <a:p>
             <a:fld id="{4D37CDCD-ABC7-4B62-9ECE-0BD25CD3F378}" type="datetimeFigureOut">
               <a:rPr lang="en-CA" smtClean="0"/>
-              <a:t>2024-07-11</a:t>
+              <a:t>2024-08-01</a:t>
             </a:fld>
             <a:endParaRPr lang="en-CA"/>
           </a:p>
@@ -5136,7 +5136,7 @@
           <a:p>
             <a:fld id="{4D37CDCD-ABC7-4B62-9ECE-0BD25CD3F378}" type="datetimeFigureOut">
               <a:rPr lang="en-CA" smtClean="0"/>
-              <a:t>2024-07-11</a:t>
+              <a:t>2024-08-01</a:t>
             </a:fld>
             <a:endParaRPr lang="en-CA"/>
           </a:p>
@@ -5413,7 +5413,7 @@
           <a:p>
             <a:fld id="{4D37CDCD-ABC7-4B62-9ECE-0BD25CD3F378}" type="datetimeFigureOut">
               <a:rPr lang="en-CA" smtClean="0"/>
-              <a:t>2024-07-11</a:t>
+              <a:t>2024-08-01</a:t>
             </a:fld>
             <a:endParaRPr lang="en-CA"/>
           </a:p>
@@ -5670,7 +5670,7 @@
           <a:p>
             <a:fld id="{4D37CDCD-ABC7-4B62-9ECE-0BD25CD3F378}" type="datetimeFigureOut">
               <a:rPr lang="en-CA" smtClean="0"/>
-              <a:t>2024-07-11</a:t>
+              <a:t>2024-08-01</a:t>
             </a:fld>
             <a:endParaRPr lang="en-CA"/>
           </a:p>
@@ -5883,7 +5883,7 @@
           <a:p>
             <a:fld id="{4D37CDCD-ABC7-4B62-9ECE-0BD25CD3F378}" type="datetimeFigureOut">
               <a:rPr lang="en-CA" smtClean="0"/>
-              <a:t>2024-07-11</a:t>
+              <a:t>2024-08-01</a:t>
             </a:fld>
             <a:endParaRPr lang="en-CA"/>
           </a:p>
@@ -6441,7 +6441,7 @@
           <a:p>
             <a:fld id="{C20C8B91-D291-430C-99AE-51CE2103E0F3}" type="datetimeFigureOut">
               <a:rPr lang="en-CA" smtClean="0"/>
-              <a:t>2024-07-11</a:t>
+              <a:t>2024-08-01</a:t>
             </a:fld>
             <a:endParaRPr lang="en-CA"/>
           </a:p>

</xml_diff>